<commit_message>
Saved powerpoint presentation as powerpont 97-2003.
</commit_message>
<xml_diff>
--- a/presentation/Natverksspel.pptx
+++ b/presentation/Natverksspel.pptx
@@ -406,7 +406,7 @@
             <a:fld id="{BFA613AE-F613-47BE-8BD3-994646580FC9}" type="datetimeFigureOut">
               <a:rPr lang="sv-SE" smtClean="0"/>
               <a:pPr/>
-              <a:t>2007-03-29</a:t>
+              <a:t>2007-04-01</a:t>
             </a:fld>
             <a:endParaRPr lang="sv-SE"/>
           </a:p>
@@ -599,7 +599,7 @@
             <a:fld id="{BFA613AE-F613-47BE-8BD3-994646580FC9}" type="datetimeFigureOut">
               <a:rPr lang="sv-SE" smtClean="0"/>
               <a:pPr/>
-              <a:t>2007-03-29</a:t>
+              <a:t>2007-04-01</a:t>
             </a:fld>
             <a:endParaRPr lang="sv-SE"/>
           </a:p>
@@ -786,7 +786,7 @@
             <a:fld id="{BFA613AE-F613-47BE-8BD3-994646580FC9}" type="datetimeFigureOut">
               <a:rPr lang="sv-SE" smtClean="0"/>
               <a:pPr/>
-              <a:t>2007-03-29</a:t>
+              <a:t>2007-04-01</a:t>
             </a:fld>
             <a:endParaRPr lang="sv-SE"/>
           </a:p>
@@ -1051,7 +1051,7 @@
             <a:fld id="{BFA613AE-F613-47BE-8BD3-994646580FC9}" type="datetimeFigureOut">
               <a:rPr lang="sv-SE" smtClean="0"/>
               <a:pPr/>
-              <a:t>2007-03-29</a:t>
+              <a:t>2007-04-01</a:t>
             </a:fld>
             <a:endParaRPr lang="sv-SE"/>
           </a:p>
@@ -1469,7 +1469,7 @@
             <a:fld id="{BFA613AE-F613-47BE-8BD3-994646580FC9}" type="datetimeFigureOut">
               <a:rPr lang="sv-SE" smtClean="0"/>
               <a:pPr/>
-              <a:t>2007-03-29</a:t>
+              <a:t>2007-04-01</a:t>
             </a:fld>
             <a:endParaRPr lang="sv-SE"/>
           </a:p>
@@ -1713,7 +1713,7 @@
             <a:fld id="{BFA613AE-F613-47BE-8BD3-994646580FC9}" type="datetimeFigureOut">
               <a:rPr lang="sv-SE" smtClean="0"/>
               <a:pPr/>
-              <a:t>2007-03-29</a:t>
+              <a:t>2007-04-01</a:t>
             </a:fld>
             <a:endParaRPr lang="sv-SE"/>
           </a:p>
@@ -1951,7 +1951,7 @@
             <a:fld id="{BFA613AE-F613-47BE-8BD3-994646580FC9}" type="datetimeFigureOut">
               <a:rPr lang="sv-SE" smtClean="0"/>
               <a:pPr/>
-              <a:t>2007-03-29</a:t>
+              <a:t>2007-04-01</a:t>
             </a:fld>
             <a:endParaRPr lang="sv-SE"/>
           </a:p>
@@ -2148,7 +2148,7 @@
             <a:fld id="{BFA613AE-F613-47BE-8BD3-994646580FC9}" type="datetimeFigureOut">
               <a:rPr lang="sv-SE" smtClean="0"/>
               <a:pPr/>
-              <a:t>2007-03-29</a:t>
+              <a:t>2007-04-01</a:t>
             </a:fld>
             <a:endParaRPr lang="sv-SE"/>
           </a:p>
@@ -2248,7 +2248,7 @@
             <a:fld id="{BFA613AE-F613-47BE-8BD3-994646580FC9}" type="datetimeFigureOut">
               <a:rPr lang="sv-SE" smtClean="0"/>
               <a:pPr/>
-              <a:t>2007-03-29</a:t>
+              <a:t>2007-04-01</a:t>
             </a:fld>
             <a:endParaRPr lang="sv-SE"/>
           </a:p>
@@ -2386,7 +2386,7 @@
             <a:fld id="{BFA613AE-F613-47BE-8BD3-994646580FC9}" type="datetimeFigureOut">
               <a:rPr lang="sv-SE" smtClean="0"/>
               <a:pPr/>
-              <a:t>2007-03-29</a:t>
+              <a:t>2007-04-01</a:t>
             </a:fld>
             <a:endParaRPr lang="sv-SE"/>
           </a:p>
@@ -2906,7 +2906,7 @@
             <a:fld id="{BFA613AE-F613-47BE-8BD3-994646580FC9}" type="datetimeFigureOut">
               <a:rPr lang="sv-SE" smtClean="0"/>
               <a:pPr/>
-              <a:t>2007-03-29</a:t>
+              <a:t>2007-04-01</a:t>
             </a:fld>
             <a:endParaRPr lang="sv-SE"/>
           </a:p>
@@ -3169,7 +3169,7 @@
             <a:fld id="{BFA613AE-F613-47BE-8BD3-994646580FC9}" type="datetimeFigureOut">
               <a:rPr lang="sv-SE" smtClean="0"/>
               <a:pPr/>
-              <a:t>2007-03-29</a:t>
+              <a:t>2007-04-01</a:t>
             </a:fld>
             <a:endParaRPr lang="sv-SE"/>
           </a:p>

</xml_diff>